<commit_message>
fix wcf course registration bug
</commit_message>
<xml_diff>
--- a/Docs/presentation/ENET_FT1_presentation.pptx
+++ b/Docs/presentation/ENET_FT1_presentation.pptx
@@ -117,7 +117,7 @@
   </p:defaultTextStyle>
   <p:extLst>
     <p:ext uri="{EFAFB233-063F-42B5-8137-9DF3F51BA10A}">
-      <p15:sldGuideLst xmlns:p15="http://schemas.microsoft.com/office/powerpoint/2012/main">
+      <p15:sldGuideLst xmlns:p15="http://schemas.microsoft.com/office/powerpoint/2012/main" xmlns="">
         <p15:guide id="1" orient="horz" pos="2160">
           <p15:clr>
             <a:srgbClr val="A4A3A4"/>
@@ -216,7 +216,8 @@
           <a:p>
             <a:fld id="{688D4497-BD68-4C84-AD45-B2C2CF68FF77}" type="datetimeFigureOut">
               <a:rPr lang="zh-CN" altLang="en-US" smtClean="0"/>
-              <a:t>2015/6/22</a:t>
+              <a:pPr/>
+              <a:t>2015/6/23</a:t>
             </a:fld>
             <a:endParaRPr lang="zh-CN" altLang="en-US"/>
           </a:p>
@@ -377,6 +378,7 @@
           <a:p>
             <a:fld id="{0D8387FF-CA20-467F-BA0A-70AD2059448D}" type="slidenum">
               <a:rPr lang="zh-CN" altLang="en-US" smtClean="0"/>
+              <a:pPr/>
               <a:t>‹#›</a:t>
             </a:fld>
             <a:endParaRPr lang="zh-CN" altLang="en-US"/>
@@ -386,7 +388,7 @@
     </p:spTree>
     <p:extLst>
       <p:ext uri="{BB962C8B-B14F-4D97-AF65-F5344CB8AC3E}">
-        <p14:creationId xmlns:p14="http://schemas.microsoft.com/office/powerpoint/2010/main" val="72100738"/>
+        <p14:creationId xmlns:p14="http://schemas.microsoft.com/office/powerpoint/2010/main" xmlns="" val="72100738"/>
       </p:ext>
     </p:extLst>
   </p:cSld>
@@ -722,6 +724,7 @@
           <a:p>
             <a:fld id="{0D8387FF-CA20-467F-BA0A-70AD2059448D}" type="slidenum">
               <a:rPr lang="zh-CN" altLang="en-US" smtClean="0"/>
+              <a:pPr/>
               <a:t>4</a:t>
             </a:fld>
             <a:endParaRPr lang="zh-CN" altLang="en-US"/>
@@ -731,7 +734,7 @@
     </p:spTree>
     <p:extLst>
       <p:ext uri="{BB962C8B-B14F-4D97-AF65-F5344CB8AC3E}">
-        <p14:creationId xmlns:p14="http://schemas.microsoft.com/office/powerpoint/2010/main" val="1053314717"/>
+        <p14:creationId xmlns:p14="http://schemas.microsoft.com/office/powerpoint/2010/main" xmlns="" val="1053314717"/>
       </p:ext>
     </p:extLst>
   </p:cSld>
@@ -866,6 +869,7 @@
           <a:p>
             <a:fld id="{0D8387FF-CA20-467F-BA0A-70AD2059448D}" type="slidenum">
               <a:rPr lang="zh-CN" altLang="en-US" smtClean="0"/>
+              <a:pPr/>
               <a:t>5</a:t>
             </a:fld>
             <a:endParaRPr lang="zh-CN" altLang="en-US"/>
@@ -875,7 +879,7 @@
     </p:spTree>
     <p:extLst>
       <p:ext uri="{BB962C8B-B14F-4D97-AF65-F5344CB8AC3E}">
-        <p14:creationId xmlns:p14="http://schemas.microsoft.com/office/powerpoint/2010/main" val="2312808557"/>
+        <p14:creationId xmlns:p14="http://schemas.microsoft.com/office/powerpoint/2010/main" xmlns="" val="2312808557"/>
       </p:ext>
     </p:extLst>
   </p:cSld>
@@ -950,6 +954,7 @@
           <a:p>
             <a:fld id="{0D8387FF-CA20-467F-BA0A-70AD2059448D}" type="slidenum">
               <a:rPr lang="zh-CN" altLang="en-US" smtClean="0"/>
+              <a:pPr/>
               <a:t>7</a:t>
             </a:fld>
             <a:endParaRPr lang="zh-CN" altLang="en-US"/>
@@ -959,7 +964,7 @@
     </p:spTree>
     <p:extLst>
       <p:ext uri="{BB962C8B-B14F-4D97-AF65-F5344CB8AC3E}">
-        <p14:creationId xmlns:p14="http://schemas.microsoft.com/office/powerpoint/2010/main" val="3803382466"/>
+        <p14:creationId xmlns:p14="http://schemas.microsoft.com/office/powerpoint/2010/main" xmlns="" val="3803382466"/>
       </p:ext>
     </p:extLst>
   </p:cSld>
@@ -1156,7 +1161,7 @@
             <a:fld id="{530820CF-B880-4189-942D-D702A7CBA730}" type="datetimeFigureOut">
               <a:rPr lang="zh-CN" altLang="en-US" smtClean="0"/>
               <a:pPr/>
-              <a:t>2015/6/22</a:t>
+              <a:t>2015/6/23</a:t>
             </a:fld>
             <a:endParaRPr lang="zh-CN" altLang="en-US"/>
           </a:p>
@@ -1208,7 +1213,7 @@
     </p:spTree>
     <p:extLst>
       <p:ext uri="{BB962C8B-B14F-4D97-AF65-F5344CB8AC3E}">
-        <p14:creationId xmlns:p14="http://schemas.microsoft.com/office/powerpoint/2010/main" val="3140642726"/>
+        <p14:creationId xmlns:p14="http://schemas.microsoft.com/office/powerpoint/2010/main" xmlns="" val="3140642726"/>
       </p:ext>
     </p:extLst>
   </p:cSld>
@@ -1433,7 +1438,7 @@
             <a:fld id="{530820CF-B880-4189-942D-D702A7CBA730}" type="datetimeFigureOut">
               <a:rPr lang="zh-CN" altLang="en-US" smtClean="0"/>
               <a:pPr/>
-              <a:t>2015/6/22</a:t>
+              <a:t>2015/6/23</a:t>
             </a:fld>
             <a:endParaRPr lang="zh-CN" altLang="en-US"/>
           </a:p>
@@ -1485,7 +1490,7 @@
     </p:spTree>
     <p:extLst>
       <p:ext uri="{BB962C8B-B14F-4D97-AF65-F5344CB8AC3E}">
-        <p14:creationId xmlns:p14="http://schemas.microsoft.com/office/powerpoint/2010/main" val="2016503657"/>
+        <p14:creationId xmlns:p14="http://schemas.microsoft.com/office/powerpoint/2010/main" xmlns="" val="2016503657"/>
       </p:ext>
     </p:extLst>
   </p:cSld>
@@ -1629,7 +1634,7 @@
             <a:fld id="{530820CF-B880-4189-942D-D702A7CBA730}" type="datetimeFigureOut">
               <a:rPr lang="zh-CN" altLang="en-US" smtClean="0"/>
               <a:pPr/>
-              <a:t>2015/6/22</a:t>
+              <a:t>2015/6/23</a:t>
             </a:fld>
             <a:endParaRPr lang="zh-CN" altLang="en-US"/>
           </a:p>
@@ -1681,7 +1686,7 @@
     </p:spTree>
     <p:extLst>
       <p:ext uri="{BB962C8B-B14F-4D97-AF65-F5344CB8AC3E}">
-        <p14:creationId xmlns:p14="http://schemas.microsoft.com/office/powerpoint/2010/main" val="3961231816"/>
+        <p14:creationId xmlns:p14="http://schemas.microsoft.com/office/powerpoint/2010/main" xmlns="" val="3961231816"/>
       </p:ext>
     </p:extLst>
   </p:cSld>
@@ -1904,7 +1909,7 @@
             <a:fld id="{530820CF-B880-4189-942D-D702A7CBA730}" type="datetimeFigureOut">
               <a:rPr lang="zh-CN" altLang="en-US" smtClean="0"/>
               <a:pPr/>
-              <a:t>2015/6/22</a:t>
+              <a:t>2015/6/23</a:t>
             </a:fld>
             <a:endParaRPr lang="zh-CN" altLang="en-US"/>
           </a:p>
@@ -2050,7 +2055,7 @@
     </p:spTree>
     <p:extLst>
       <p:ext uri="{BB962C8B-B14F-4D97-AF65-F5344CB8AC3E}">
-        <p14:creationId xmlns:p14="http://schemas.microsoft.com/office/powerpoint/2010/main" val="3412427439"/>
+        <p14:creationId xmlns:p14="http://schemas.microsoft.com/office/powerpoint/2010/main" xmlns="" val="3412427439"/>
       </p:ext>
     </p:extLst>
   </p:cSld>
@@ -2247,7 +2252,7 @@
             <a:fld id="{530820CF-B880-4189-942D-D702A7CBA730}" type="datetimeFigureOut">
               <a:rPr lang="zh-CN" altLang="en-US" smtClean="0"/>
               <a:pPr/>
-              <a:t>2015/6/22</a:t>
+              <a:t>2015/6/23</a:t>
             </a:fld>
             <a:endParaRPr lang="zh-CN" altLang="en-US"/>
           </a:p>
@@ -2299,7 +2304,7 @@
     </p:spTree>
     <p:extLst>
       <p:ext uri="{BB962C8B-B14F-4D97-AF65-F5344CB8AC3E}">
-        <p14:creationId xmlns:p14="http://schemas.microsoft.com/office/powerpoint/2010/main" val="3604736829"/>
+        <p14:creationId xmlns:p14="http://schemas.microsoft.com/office/powerpoint/2010/main" xmlns="" val="3604736829"/>
       </p:ext>
     </p:extLst>
   </p:cSld>
@@ -2872,7 +2877,7 @@
             <a:fld id="{530820CF-B880-4189-942D-D702A7CBA730}" type="datetimeFigureOut">
               <a:rPr lang="zh-CN" altLang="en-US" smtClean="0"/>
               <a:pPr/>
-              <a:t>2015/6/22</a:t>
+              <a:t>2015/6/23</a:t>
             </a:fld>
             <a:endParaRPr lang="zh-CN" altLang="en-US"/>
           </a:p>
@@ -2924,7 +2929,7 @@
     </p:spTree>
     <p:extLst>
       <p:ext uri="{BB962C8B-B14F-4D97-AF65-F5344CB8AC3E}">
-        <p14:creationId xmlns:p14="http://schemas.microsoft.com/office/powerpoint/2010/main" val="3251260666"/>
+        <p14:creationId xmlns:p14="http://schemas.microsoft.com/office/powerpoint/2010/main" xmlns="" val="3251260666"/>
       </p:ext>
     </p:extLst>
   </p:cSld>
@@ -3734,7 +3739,7 @@
             <a:fld id="{530820CF-B880-4189-942D-D702A7CBA730}" type="datetimeFigureOut">
               <a:rPr lang="zh-CN" altLang="en-US" smtClean="0"/>
               <a:pPr/>
-              <a:t>2015/6/22</a:t>
+              <a:t>2015/6/23</a:t>
             </a:fld>
             <a:endParaRPr lang="zh-CN" altLang="en-US"/>
           </a:p>
@@ -3786,7 +3791,7 @@
     </p:spTree>
     <p:extLst>
       <p:ext uri="{BB962C8B-B14F-4D97-AF65-F5344CB8AC3E}">
-        <p14:creationId xmlns:p14="http://schemas.microsoft.com/office/powerpoint/2010/main" val="524872144"/>
+        <p14:creationId xmlns:p14="http://schemas.microsoft.com/office/powerpoint/2010/main" xmlns="" val="524872144"/>
       </p:ext>
     </p:extLst>
   </p:cSld>
@@ -3906,7 +3911,7 @@
             <a:fld id="{530820CF-B880-4189-942D-D702A7CBA730}" type="datetimeFigureOut">
               <a:rPr lang="zh-CN" altLang="en-US" smtClean="0"/>
               <a:pPr/>
-              <a:t>2015/6/22</a:t>
+              <a:t>2015/6/23</a:t>
             </a:fld>
             <a:endParaRPr lang="zh-CN" altLang="en-US"/>
           </a:p>
@@ -3958,7 +3963,7 @@
     </p:spTree>
     <p:extLst>
       <p:ext uri="{BB962C8B-B14F-4D97-AF65-F5344CB8AC3E}">
-        <p14:creationId xmlns:p14="http://schemas.microsoft.com/office/powerpoint/2010/main" val="2376434445"/>
+        <p14:creationId xmlns:p14="http://schemas.microsoft.com/office/powerpoint/2010/main" xmlns="" val="2376434445"/>
       </p:ext>
     </p:extLst>
   </p:cSld>
@@ -4088,7 +4093,7 @@
             <a:fld id="{530820CF-B880-4189-942D-D702A7CBA730}" type="datetimeFigureOut">
               <a:rPr lang="zh-CN" altLang="en-US" smtClean="0"/>
               <a:pPr/>
-              <a:t>2015/6/22</a:t>
+              <a:t>2015/6/23</a:t>
             </a:fld>
             <a:endParaRPr lang="zh-CN" altLang="en-US"/>
           </a:p>
@@ -4140,7 +4145,7 @@
     </p:spTree>
     <p:extLst>
       <p:ext uri="{BB962C8B-B14F-4D97-AF65-F5344CB8AC3E}">
-        <p14:creationId xmlns:p14="http://schemas.microsoft.com/office/powerpoint/2010/main" val="3804254376"/>
+        <p14:creationId xmlns:p14="http://schemas.microsoft.com/office/powerpoint/2010/main" xmlns="" val="3804254376"/>
       </p:ext>
     </p:extLst>
   </p:cSld>
@@ -4260,7 +4265,7 @@
             <a:fld id="{530820CF-B880-4189-942D-D702A7CBA730}" type="datetimeFigureOut">
               <a:rPr lang="zh-CN" altLang="en-US" smtClean="0"/>
               <a:pPr/>
-              <a:t>2015/6/22</a:t>
+              <a:t>2015/6/23</a:t>
             </a:fld>
             <a:endParaRPr lang="zh-CN" altLang="en-US"/>
           </a:p>
@@ -4312,7 +4317,7 @@
     </p:spTree>
     <p:extLst>
       <p:ext uri="{BB962C8B-B14F-4D97-AF65-F5344CB8AC3E}">
-        <p14:creationId xmlns:p14="http://schemas.microsoft.com/office/powerpoint/2010/main" val="3755879249"/>
+        <p14:creationId xmlns:p14="http://schemas.microsoft.com/office/powerpoint/2010/main" xmlns="" val="3755879249"/>
       </p:ext>
     </p:extLst>
   </p:cSld>
@@ -4509,7 +4514,7 @@
             <a:fld id="{530820CF-B880-4189-942D-D702A7CBA730}" type="datetimeFigureOut">
               <a:rPr lang="zh-CN" altLang="en-US" smtClean="0"/>
               <a:pPr/>
-              <a:t>2015/6/22</a:t>
+              <a:t>2015/6/23</a:t>
             </a:fld>
             <a:endParaRPr lang="zh-CN" altLang="en-US"/>
           </a:p>
@@ -4561,7 +4566,7 @@
     </p:spTree>
     <p:extLst>
       <p:ext uri="{BB962C8B-B14F-4D97-AF65-F5344CB8AC3E}">
-        <p14:creationId xmlns:p14="http://schemas.microsoft.com/office/powerpoint/2010/main" val="2668804196"/>
+        <p14:creationId xmlns:p14="http://schemas.microsoft.com/office/powerpoint/2010/main" xmlns="" val="2668804196"/>
       </p:ext>
     </p:extLst>
   </p:cSld>
@@ -4803,7 +4808,7 @@
             <a:fld id="{530820CF-B880-4189-942D-D702A7CBA730}" type="datetimeFigureOut">
               <a:rPr lang="zh-CN" altLang="en-US" smtClean="0"/>
               <a:pPr/>
-              <a:t>2015/6/22</a:t>
+              <a:t>2015/6/23</a:t>
             </a:fld>
             <a:endParaRPr lang="zh-CN" altLang="en-US"/>
           </a:p>
@@ -4855,7 +4860,7 @@
     </p:spTree>
     <p:extLst>
       <p:ext uri="{BB962C8B-B14F-4D97-AF65-F5344CB8AC3E}">
-        <p14:creationId xmlns:p14="http://schemas.microsoft.com/office/powerpoint/2010/main" val="1894714509"/>
+        <p14:creationId xmlns:p14="http://schemas.microsoft.com/office/powerpoint/2010/main" xmlns="" val="1894714509"/>
       </p:ext>
     </p:extLst>
   </p:cSld>
@@ -5249,7 +5254,7 @@
             <a:fld id="{530820CF-B880-4189-942D-D702A7CBA730}" type="datetimeFigureOut">
               <a:rPr lang="zh-CN" altLang="en-US" smtClean="0"/>
               <a:pPr/>
-              <a:t>2015/6/22</a:t>
+              <a:t>2015/6/23</a:t>
             </a:fld>
             <a:endParaRPr lang="zh-CN" altLang="en-US"/>
           </a:p>
@@ -5301,7 +5306,7 @@
     </p:spTree>
     <p:extLst>
       <p:ext uri="{BB962C8B-B14F-4D97-AF65-F5344CB8AC3E}">
-        <p14:creationId xmlns:p14="http://schemas.microsoft.com/office/powerpoint/2010/main" val="2308593834"/>
+        <p14:creationId xmlns:p14="http://schemas.microsoft.com/office/powerpoint/2010/main" xmlns="" val="2308593834"/>
       </p:ext>
     </p:extLst>
   </p:cSld>
@@ -5369,7 +5374,7 @@
             <a:fld id="{530820CF-B880-4189-942D-D702A7CBA730}" type="datetimeFigureOut">
               <a:rPr lang="zh-CN" altLang="en-US" smtClean="0"/>
               <a:pPr/>
-              <a:t>2015/6/22</a:t>
+              <a:t>2015/6/23</a:t>
             </a:fld>
             <a:endParaRPr lang="zh-CN" altLang="en-US"/>
           </a:p>
@@ -5421,7 +5426,7 @@
     </p:spTree>
     <p:extLst>
       <p:ext uri="{BB962C8B-B14F-4D97-AF65-F5344CB8AC3E}">
-        <p14:creationId xmlns:p14="http://schemas.microsoft.com/office/powerpoint/2010/main" val="2793175138"/>
+        <p14:creationId xmlns:p14="http://schemas.microsoft.com/office/powerpoint/2010/main" xmlns="" val="2793175138"/>
       </p:ext>
     </p:extLst>
   </p:cSld>
@@ -5466,7 +5471,7 @@
             <a:fld id="{530820CF-B880-4189-942D-D702A7CBA730}" type="datetimeFigureOut">
               <a:rPr lang="zh-CN" altLang="en-US" smtClean="0"/>
               <a:pPr/>
-              <a:t>2015/6/22</a:t>
+              <a:t>2015/6/23</a:t>
             </a:fld>
             <a:endParaRPr lang="zh-CN" altLang="en-US"/>
           </a:p>
@@ -5518,7 +5523,7 @@
     </p:spTree>
     <p:extLst>
       <p:ext uri="{BB962C8B-B14F-4D97-AF65-F5344CB8AC3E}">
-        <p14:creationId xmlns:p14="http://schemas.microsoft.com/office/powerpoint/2010/main" val="1487495213"/>
+        <p14:creationId xmlns:p14="http://schemas.microsoft.com/office/powerpoint/2010/main" xmlns="" val="1487495213"/>
       </p:ext>
     </p:extLst>
   </p:cSld>
@@ -5747,7 +5752,7 @@
             <a:fld id="{530820CF-B880-4189-942D-D702A7CBA730}" type="datetimeFigureOut">
               <a:rPr lang="zh-CN" altLang="en-US" smtClean="0"/>
               <a:pPr/>
-              <a:t>2015/6/22</a:t>
+              <a:t>2015/6/23</a:t>
             </a:fld>
             <a:endParaRPr lang="zh-CN" altLang="en-US"/>
           </a:p>
@@ -5799,7 +5804,7 @@
     </p:spTree>
     <p:extLst>
       <p:ext uri="{BB962C8B-B14F-4D97-AF65-F5344CB8AC3E}">
-        <p14:creationId xmlns:p14="http://schemas.microsoft.com/office/powerpoint/2010/main" val="2290731936"/>
+        <p14:creationId xmlns:p14="http://schemas.microsoft.com/office/powerpoint/2010/main" xmlns="" val="2290731936"/>
       </p:ext>
     </p:extLst>
   </p:cSld>
@@ -6024,7 +6029,7 @@
             <a:fld id="{530820CF-B880-4189-942D-D702A7CBA730}" type="datetimeFigureOut">
               <a:rPr lang="zh-CN" altLang="en-US" smtClean="0"/>
               <a:pPr/>
-              <a:t>2015/6/22</a:t>
+              <a:t>2015/6/23</a:t>
             </a:fld>
             <a:endParaRPr lang="zh-CN" altLang="en-US"/>
           </a:p>
@@ -6076,7 +6081,7 @@
     </p:spTree>
     <p:extLst>
       <p:ext uri="{BB962C8B-B14F-4D97-AF65-F5344CB8AC3E}">
-        <p14:creationId xmlns:p14="http://schemas.microsoft.com/office/powerpoint/2010/main" val="791014888"/>
+        <p14:creationId xmlns:p14="http://schemas.microsoft.com/office/powerpoint/2010/main" xmlns="" val="791014888"/>
       </p:ext>
     </p:extLst>
   </p:cSld>
@@ -6591,7 +6596,7 @@
             <a:fld id="{530820CF-B880-4189-942D-D702A7CBA730}" type="datetimeFigureOut">
               <a:rPr lang="zh-CN" altLang="en-US" smtClean="0"/>
               <a:pPr/>
-              <a:t>2015/6/22</a:t>
+              <a:t>2015/6/23</a:t>
             </a:fld>
             <a:endParaRPr lang="zh-CN" altLang="en-US"/>
           </a:p>
@@ -6680,7 +6685,7 @@
     </p:spTree>
     <p:extLst>
       <p:ext uri="{BB962C8B-B14F-4D97-AF65-F5344CB8AC3E}">
-        <p14:creationId xmlns:p14="http://schemas.microsoft.com/office/powerpoint/2010/main" val="2829804012"/>
+        <p14:creationId xmlns:p14="http://schemas.microsoft.com/office/powerpoint/2010/main" xmlns="" val="2829804012"/>
       </p:ext>
     </p:extLst>
   </p:cSld>
@@ -7167,7 +7172,7 @@
         <p:spPr>
           <a:xfrm>
             <a:off x="971600" y="1628800"/>
-            <a:ext cx="6624736" cy="3384376"/>
+            <a:ext cx="6984776" cy="3960440"/>
           </a:xfrm>
         </p:spPr>
         <p:txBody>
@@ -7186,11 +7191,11 @@
                 <a:latin typeface="Times New Roman" pitchFamily="18" charset="0"/>
                 <a:cs typeface="Times New Roman" pitchFamily="18" charset="0"/>
               </a:rPr>
-              <a:t>Guiding principles </a:t>
-            </a:r>
-          </a:p>
-          <a:p>
-            <a:pPr marL="457200" indent="-457200" algn="l">
+              <a:t>.NET I</a:t>
+            </a:r>
+          </a:p>
+          <a:p>
+            <a:pPr marL="914400" lvl="1" indent="-457200" algn="l">
               <a:buFont typeface="Wingdings" panose="05000000000000000000" pitchFamily="2" charset="2"/>
               <a:buChar char="Ø"/>
             </a:pPr>
@@ -7202,11 +7207,47 @@
                 <a:latin typeface="Times New Roman" pitchFamily="18" charset="0"/>
                 <a:cs typeface="Times New Roman" pitchFamily="18" charset="0"/>
               </a:rPr>
-              <a:t>Technical features</a:t>
-            </a:r>
-          </a:p>
-          <a:p>
-            <a:pPr marL="457200" indent="-457200">
+              <a:t>Guiding </a:t>
+            </a:r>
+            <a:r>
+              <a:rPr lang="en-US" altLang="zh-CN" dirty="0" smtClean="0">
+                <a:solidFill>
+                  <a:schemeClr val="tx1"/>
+                </a:solidFill>
+                <a:latin typeface="Times New Roman" pitchFamily="18" charset="0"/>
+                <a:cs typeface="Times New Roman" pitchFamily="18" charset="0"/>
+              </a:rPr>
+              <a:t>principles </a:t>
+            </a:r>
+          </a:p>
+          <a:p>
+            <a:pPr marL="914400" lvl="1" indent="-457200" algn="l">
+              <a:buFont typeface="Wingdings" panose="05000000000000000000" pitchFamily="2" charset="2"/>
+              <a:buChar char="Ø"/>
+            </a:pPr>
+            <a:r>
+              <a:rPr lang="en-US" altLang="zh-CN" dirty="0" smtClean="0">
+                <a:solidFill>
+                  <a:schemeClr val="tx1"/>
+                </a:solidFill>
+                <a:latin typeface="Times New Roman" pitchFamily="18" charset="0"/>
+                <a:cs typeface="Times New Roman" pitchFamily="18" charset="0"/>
+              </a:rPr>
+              <a:t>Technical </a:t>
+            </a:r>
+            <a:r>
+              <a:rPr lang="en-US" altLang="zh-CN" dirty="0" smtClean="0">
+                <a:solidFill>
+                  <a:schemeClr val="tx1"/>
+                </a:solidFill>
+                <a:latin typeface="Times New Roman" pitchFamily="18" charset="0"/>
+                <a:cs typeface="Times New Roman" pitchFamily="18" charset="0"/>
+              </a:rPr>
+              <a:t>features</a:t>
+            </a:r>
+          </a:p>
+          <a:p>
+            <a:pPr marL="914400" lvl="1" indent="-457200" algn="l">
               <a:buFont typeface="Wingdings" panose="05000000000000000000" pitchFamily="2" charset="2"/>
               <a:buChar char="Ø"/>
             </a:pPr>
@@ -7228,40 +7269,7 @@
                 <a:latin typeface="Times New Roman" pitchFamily="18" charset="0"/>
                 <a:cs typeface="Times New Roman" pitchFamily="18" charset="0"/>
               </a:rPr>
-              <a:t>walkthrough &amp; demo</a:t>
-            </a:r>
-            <a:endParaRPr lang="en-US" altLang="zh-CN" dirty="0" smtClean="0">
-              <a:solidFill>
-                <a:schemeClr val="tx1"/>
-              </a:solidFill>
-              <a:latin typeface="Times New Roman" pitchFamily="18" charset="0"/>
-              <a:cs typeface="Times New Roman" pitchFamily="18" charset="0"/>
-            </a:endParaRPr>
-          </a:p>
-          <a:p>
-            <a:pPr marL="457200" indent="-457200" algn="l">
-              <a:buFont typeface="Wingdings" panose="05000000000000000000" pitchFamily="2" charset="2"/>
-              <a:buChar char="Ø"/>
-            </a:pPr>
-            <a:r>
-              <a:rPr lang="en-US" altLang="zh-CN" dirty="0" smtClean="0">
-                <a:solidFill>
-                  <a:schemeClr val="tx1"/>
-                </a:solidFill>
-                <a:latin typeface="Times New Roman" pitchFamily="18" charset="0"/>
-                <a:cs typeface="Times New Roman" pitchFamily="18" charset="0"/>
-              </a:rPr>
-              <a:t>WCF </a:t>
-            </a:r>
-            <a:r>
-              <a:rPr lang="en-US" altLang="zh-CN" dirty="0" smtClean="0">
-                <a:solidFill>
-                  <a:schemeClr val="tx1"/>
-                </a:solidFill>
-                <a:latin typeface="Times New Roman" pitchFamily="18" charset="0"/>
-                <a:cs typeface="Times New Roman" pitchFamily="18" charset="0"/>
-              </a:rPr>
-              <a:t>code walkthrough &amp; </a:t>
+              <a:t>walkthrough &amp; </a:t>
             </a:r>
             <a:r>
               <a:rPr lang="en-US" altLang="zh-CN" dirty="0" smtClean="0">
@@ -7280,6 +7288,65 @@
               <a:buChar char="Ø"/>
             </a:pPr>
             <a:r>
+              <a:rPr lang="en-US" altLang="zh-CN" dirty="0" smtClean="0">
+                <a:solidFill>
+                  <a:schemeClr val="tx1"/>
+                </a:solidFill>
+                <a:latin typeface="Times New Roman" pitchFamily="18" charset="0"/>
+                <a:cs typeface="Times New Roman" pitchFamily="18" charset="0"/>
+              </a:rPr>
+              <a:t>.net II</a:t>
+            </a:r>
+            <a:endParaRPr lang="en-US" altLang="zh-CN" dirty="0" smtClean="0">
+              <a:solidFill>
+                <a:schemeClr val="tx1"/>
+              </a:solidFill>
+              <a:latin typeface="Times New Roman" pitchFamily="18" charset="0"/>
+              <a:cs typeface="Times New Roman" pitchFamily="18" charset="0"/>
+            </a:endParaRPr>
+          </a:p>
+          <a:p>
+            <a:pPr marL="914400" lvl="1" indent="-457200" algn="l">
+              <a:buFont typeface="Wingdings" panose="05000000000000000000" pitchFamily="2" charset="2"/>
+              <a:buChar char="Ø"/>
+            </a:pPr>
+            <a:r>
+              <a:rPr lang="en-US" altLang="zh-CN" dirty="0" smtClean="0">
+                <a:solidFill>
+                  <a:schemeClr val="tx1"/>
+                </a:solidFill>
+                <a:latin typeface="Times New Roman" pitchFamily="18" charset="0"/>
+                <a:cs typeface="Times New Roman" pitchFamily="18" charset="0"/>
+              </a:rPr>
+              <a:t>WCF code walkthrough &amp; </a:t>
+            </a:r>
+            <a:r>
+              <a:rPr lang="en-US" altLang="zh-CN" dirty="0" smtClean="0">
+                <a:solidFill>
+                  <a:schemeClr val="tx1"/>
+                </a:solidFill>
+                <a:latin typeface="Times New Roman" pitchFamily="18" charset="0"/>
+                <a:cs typeface="Times New Roman" pitchFamily="18" charset="0"/>
+              </a:rPr>
+              <a:t>demo</a:t>
+            </a:r>
+          </a:p>
+          <a:p>
+            <a:pPr marL="914400" lvl="1" indent="-457200" algn="l">
+              <a:buFont typeface="Wingdings" panose="05000000000000000000" pitchFamily="2" charset="2"/>
+              <a:buChar char="Ø"/>
+            </a:pPr>
+            <a:r>
+              <a:rPr lang="en-US" altLang="zh-CN" dirty="0" smtClean="0">
+                <a:solidFill>
+                  <a:schemeClr val="tx1"/>
+                </a:solidFill>
+                <a:latin typeface="Times New Roman" pitchFamily="18" charset="0"/>
+                <a:cs typeface="Times New Roman" pitchFamily="18" charset="0"/>
+              </a:rPr>
+              <a:t>Service </a:t>
+            </a:r>
+            <a:r>
               <a:rPr lang="en-US" altLang="zh-CN" dirty="0">
                 <a:solidFill>
                   <a:schemeClr val="tx1"/>
@@ -7287,7 +7354,7 @@
                 <a:latin typeface="Times New Roman" pitchFamily="18" charset="0"/>
                 <a:cs typeface="Times New Roman" pitchFamily="18" charset="0"/>
               </a:rPr>
-              <a:t>Service layer binding &amp; security</a:t>
+              <a:t>layer binding &amp; security</a:t>
             </a:r>
             <a:endParaRPr lang="en-US" altLang="zh-CN" dirty="0" smtClean="0">
               <a:solidFill>
@@ -7298,7 +7365,7 @@
             </a:endParaRPr>
           </a:p>
           <a:p>
-            <a:pPr marL="457200" indent="-457200" algn="l">
+            <a:pPr marL="914400" lvl="1" indent="-457200" algn="l">
               <a:buFont typeface="Wingdings" panose="05000000000000000000" pitchFamily="2" charset="2"/>
               <a:buChar char="Ø"/>
             </a:pPr>
@@ -7580,8 +7647,8 @@
           </p:nvSpPr>
           <p:spPr>
             <a:xfrm>
-              <a:off x="4672013" y="1556957"/>
-              <a:ext cx="2466974" cy="985911"/>
+              <a:off x="4672013" y="1408329"/>
+              <a:ext cx="2466974" cy="1134540"/>
             </a:xfrm>
             <a:prstGeom prst="rect">
               <a:avLst/>
@@ -7698,11 +7765,11 @@
             <a:p>
               <a:pPr algn="ctr"/>
               <a:r>
-                <a:rPr lang="en-US" altLang="zh-CN" sz="1100" b="1"/>
+                <a:rPr lang="en-US" altLang="zh-CN" sz="1100" b="1" dirty="0"/>
                 <a:t>Service</a:t>
               </a:r>
               <a:r>
-                <a:rPr lang="en-US" altLang="zh-CN" sz="1100" b="1" baseline="0"/>
+                <a:rPr lang="en-US" altLang="zh-CN" sz="1100" b="1" baseline="0" dirty="0"/>
                 <a:t> Layer</a:t>
               </a:r>
             </a:p>
@@ -8534,8 +8601,8 @@
           </p:nvSpPr>
           <p:spPr>
             <a:xfrm>
-              <a:off x="2005013" y="1556955"/>
-              <a:ext cx="2552700" cy="990601"/>
+              <a:off x="2005013" y="1408327"/>
+              <a:ext cx="2552700" cy="1139228"/>
             </a:xfrm>
             <a:prstGeom prst="rect">
               <a:avLst/>
@@ -8671,8 +8738,8 @@
           </p:nvSpPr>
           <p:spPr>
             <a:xfrm>
-              <a:off x="2147889" y="1804607"/>
-              <a:ext cx="1133474" cy="559991"/>
+              <a:off x="2147889" y="1790836"/>
+              <a:ext cx="1133474" cy="573763"/>
             </a:xfrm>
             <a:prstGeom prst="rect">
               <a:avLst/>
@@ -8790,16 +8857,13 @@
               <a:pPr algn="ctr"/>
               <a:r>
                 <a:rPr lang="en-US" altLang="zh-CN" sz="1100" dirty="0"/>
-                <a:t>ASP.NET MVC</a:t>
+                <a:t>ASP.NET </a:t>
               </a:r>
-            </a:p>
-            <a:p>
-              <a:pPr algn="ctr"/>
               <a:r>
-                <a:rPr lang="en-US" altLang="zh-CN" sz="1100" dirty="0"/>
-                <a:t>for external</a:t>
+                <a:rPr lang="en-US" altLang="zh-CN" sz="1100" dirty="0" smtClean="0"/>
+                <a:t>MVC</a:t>
               </a:r>
-              <a:endParaRPr lang="zh-CN" altLang="en-US" sz="1100" dirty="0"/>
+              <a:endParaRPr lang="en-US" altLang="zh-CN" sz="1100" dirty="0"/>
             </a:p>
           </p:txBody>
         </p:sp>
@@ -8811,8 +8875,8 @@
           </p:nvSpPr>
           <p:spPr>
             <a:xfrm>
-              <a:off x="3367089" y="1814132"/>
-              <a:ext cx="1038223" cy="550467"/>
+              <a:off x="3367089" y="1790836"/>
+              <a:ext cx="1038223" cy="573763"/>
             </a:xfrm>
             <a:prstGeom prst="rect">
               <a:avLst/>
@@ -8929,19 +8993,8 @@
             <a:p>
               <a:pPr algn="ctr"/>
               <a:r>
-                <a:rPr lang="en-US" altLang="zh-CN" sz="1100" dirty="0"/>
+                <a:rPr lang="en-US" altLang="zh-CN" sz="1100" dirty="0" smtClean="0"/>
                 <a:t>WEBFORM</a:t>
-              </a:r>
-            </a:p>
-            <a:p>
-              <a:pPr algn="ctr"/>
-              <a:r>
-                <a:rPr lang="en-US" altLang="zh-CN" sz="1100" dirty="0"/>
-                <a:t>for</a:t>
-              </a:r>
-              <a:r>
-                <a:rPr lang="en-US" altLang="zh-CN" sz="1100" baseline="0" dirty="0"/>
-                <a:t> internal</a:t>
               </a:r>
               <a:endParaRPr lang="zh-CN" altLang="en-US" sz="1100" dirty="0"/>
             </a:p>
@@ -9084,8 +9137,8 @@
           </p:nvSpPr>
           <p:spPr>
             <a:xfrm>
-              <a:off x="7329487" y="1471231"/>
-              <a:ext cx="724607" cy="2464279"/>
+              <a:off x="7269163" y="1408327"/>
+              <a:ext cx="803100" cy="2527183"/>
             </a:xfrm>
             <a:prstGeom prst="rect">
               <a:avLst/>
@@ -9796,7 +9849,7 @@
           <p:spPr>
             <a:xfrm>
               <a:off x="4776789" y="1899857"/>
-              <a:ext cx="1038224" cy="285750"/>
+              <a:ext cx="1038223" cy="464741"/>
             </a:xfrm>
             <a:prstGeom prst="rect">
               <a:avLst/>
@@ -9929,7 +9982,7 @@
           <p:spPr>
             <a:xfrm>
               <a:off x="5986464" y="1899857"/>
-              <a:ext cx="1038224" cy="285750"/>
+              <a:ext cx="1038223" cy="464741"/>
             </a:xfrm>
             <a:prstGeom prst="rect">
               <a:avLst/>
@@ -10046,10 +10099,10 @@
             <a:p>
               <a:pPr algn="ctr"/>
               <a:r>
-                <a:rPr lang="en-US" altLang="zh-CN" sz="1100"/>
+                <a:rPr lang="en-US" altLang="zh-CN" sz="1100" dirty="0"/>
                 <a:t>WCF</a:t>
               </a:r>
-              <a:endParaRPr lang="zh-CN" altLang="en-US" sz="1100"/>
+              <a:endParaRPr lang="zh-CN" altLang="en-US" sz="1100" dirty="0"/>
             </a:p>
           </p:txBody>
         </p:sp>
@@ -10319,8 +10372,8 @@
           </p:nvSpPr>
           <p:spPr>
             <a:xfrm rot="5400000">
-              <a:off x="5772150" y="2542798"/>
-              <a:ext cx="238126" cy="152401"/>
+              <a:off x="5775226" y="2500015"/>
+              <a:ext cx="277834" cy="198261"/>
             </a:xfrm>
             <a:prstGeom prst="leftRightArrow">
               <a:avLst/>
@@ -10577,8 +10630,8 @@
           </p:nvSpPr>
           <p:spPr>
             <a:xfrm flipV="1">
-              <a:off x="4424363" y="2023682"/>
-              <a:ext cx="333373" cy="123827"/>
+              <a:off x="4424363" y="2023681"/>
+              <a:ext cx="333373" cy="245290"/>
             </a:xfrm>
             <a:prstGeom prst="leftRightArrow">
               <a:avLst/>
@@ -10794,7 +10847,15 @@
           <a:p>
             <a:r>
               <a:rPr lang="en-US" altLang="zh-CN" dirty="0" smtClean="0"/>
-              <a:t>BLL: Domain Model pattern, Singleton</a:t>
+              <a:t>BLL: Domain Model </a:t>
+            </a:r>
+            <a:r>
+              <a:rPr lang="en-US" altLang="zh-CN" dirty="0" smtClean="0"/>
+              <a:t>Pattern</a:t>
+            </a:r>
+            <a:r>
+              <a:rPr lang="en-US" altLang="zh-CN" dirty="0" smtClean="0"/>
+              <a:t>, Singleton</a:t>
             </a:r>
           </a:p>
           <a:p>
@@ -11299,10 +11360,10 @@
           </p:nvPr>
         </p:nvPicPr>
         <p:blipFill>
-          <a:blip r:embed="rId2">
+          <a:blip r:embed="rId2" cstate="print">
             <a:extLst>
               <a:ext uri="{28A0092B-C50C-407E-A947-70E740481C1C}">
-                <a14:useLocalDpi xmlns:a14="http://schemas.microsoft.com/office/drawing/2010/main" val="0"/>
+                <a14:useLocalDpi xmlns:a14="http://schemas.microsoft.com/office/drawing/2010/main" xmlns="" val="0"/>
               </a:ext>
             </a:extLst>
           </a:blip>
@@ -11320,7 +11381,7 @@
     </p:spTree>
     <p:extLst>
       <p:ext uri="{BB962C8B-B14F-4D97-AF65-F5344CB8AC3E}">
-        <p14:creationId xmlns:p14="http://schemas.microsoft.com/office/powerpoint/2010/main" val="1531509330"/>
+        <p14:creationId xmlns:p14="http://schemas.microsoft.com/office/powerpoint/2010/main" xmlns="" val="1531509330"/>
       </p:ext>
     </p:extLst>
   </p:cSld>
@@ -11467,7 +11528,7 @@
     </a:clrScheme>
     <a:fontScheme name="Ion">
       <a:majorFont>
-        <a:latin typeface="Century Gothic" panose="020B0502020202020204"/>
+        <a:latin typeface="Century Gothic"/>
         <a:ea typeface=""/>
         <a:cs typeface=""/>
         <a:font script="Jpan" typeface="メイリオ"/>
@@ -11502,7 +11563,7 @@
         <a:font script="Geor" typeface="Sylfaen"/>
       </a:majorFont>
       <a:minorFont>
-        <a:latin typeface="Century Gothic" panose="020B0502020202020204"/>
+        <a:latin typeface="Century Gothic"/>
         <a:ea typeface=""/>
         <a:cs typeface=""/>
         <a:font script="Jpan" typeface="メイリオ"/>
@@ -11684,7 +11745,7 @@
   <a:extraClrSchemeLst/>
   <a:extLst>
     <a:ext uri="{05A4C25C-085E-4340-85A3-A5531E510DB2}">
-      <thm15:themeFamily xmlns:thm15="http://schemas.microsoft.com/office/thememl/2012/main" name="Ion" id="{B8441ADB-2E43-4AF7-B97A-BD870242C6A8}" vid="{292E63A9-BB86-4E3D-B92A-7223C6510D2E}"/>
+      <thm15:themeFamily xmlns:thm15="http://schemas.microsoft.com/office/thememl/2012/main" xmlns="" name="Ion" id="{B8441ADB-2E43-4AF7-B97A-BD870242C6A8}" vid="{292E63A9-BB86-4E3D-B92A-7223C6510D2E}"/>
     </a:ext>
   </a:extLst>
 </a:theme>

</xml_diff>